<commit_message>
Lecture 4 - group 2
</commit_message>
<xml_diff>
--- a/Lecture-04/materials/Class08-AdvancedTypeScript.pptx
+++ b/Lecture-04/materials/Class08-AdvancedTypeScript.pptx
@@ -602,7 +602,7 @@
           <a:p>
             <a:fld id="{B8236D89-3664-4D4B-9D57-535A908AD601}" type="datetimeFigureOut">
               <a:rPr lang="en-US" smtClean="0"/>
-              <a:t>10/16/2023</a:t>
+              <a:t>10/17/2023</a:t>
             </a:fld>
             <a:endParaRPr lang="en-US"/>
           </a:p>
@@ -800,7 +800,7 @@
           <a:p>
             <a:fld id="{B8236D89-3664-4D4B-9D57-535A908AD601}" type="datetimeFigureOut">
               <a:rPr lang="en-US" smtClean="0"/>
-              <a:t>10/16/2023</a:t>
+              <a:t>10/17/2023</a:t>
             </a:fld>
             <a:endParaRPr lang="en-US"/>
           </a:p>
@@ -1008,7 +1008,7 @@
           <a:p>
             <a:fld id="{B8236D89-3664-4D4B-9D57-535A908AD601}" type="datetimeFigureOut">
               <a:rPr lang="en-US" smtClean="0"/>
-              <a:t>10/16/2023</a:t>
+              <a:t>10/17/2023</a:t>
             </a:fld>
             <a:endParaRPr lang="en-US"/>
           </a:p>
@@ -1206,7 +1206,7 @@
           <a:p>
             <a:fld id="{B8236D89-3664-4D4B-9D57-535A908AD601}" type="datetimeFigureOut">
               <a:rPr lang="en-US" smtClean="0"/>
-              <a:t>10/16/2023</a:t>
+              <a:t>10/17/2023</a:t>
             </a:fld>
             <a:endParaRPr lang="en-US"/>
           </a:p>
@@ -1481,7 +1481,7 @@
           <a:p>
             <a:fld id="{B8236D89-3664-4D4B-9D57-535A908AD601}" type="datetimeFigureOut">
               <a:rPr lang="en-US" smtClean="0"/>
-              <a:t>10/16/2023</a:t>
+              <a:t>10/17/2023</a:t>
             </a:fld>
             <a:endParaRPr lang="en-US"/>
           </a:p>
@@ -1746,7 +1746,7 @@
           <a:p>
             <a:fld id="{B8236D89-3664-4D4B-9D57-535A908AD601}" type="datetimeFigureOut">
               <a:rPr lang="en-US" smtClean="0"/>
-              <a:t>10/16/2023</a:t>
+              <a:t>10/17/2023</a:t>
             </a:fld>
             <a:endParaRPr lang="en-US"/>
           </a:p>
@@ -2158,7 +2158,7 @@
           <a:p>
             <a:fld id="{B8236D89-3664-4D4B-9D57-535A908AD601}" type="datetimeFigureOut">
               <a:rPr lang="en-US" smtClean="0"/>
-              <a:t>10/16/2023</a:t>
+              <a:t>10/17/2023</a:t>
             </a:fld>
             <a:endParaRPr lang="en-US"/>
           </a:p>
@@ -2299,7 +2299,7 @@
           <a:p>
             <a:fld id="{B8236D89-3664-4D4B-9D57-535A908AD601}" type="datetimeFigureOut">
               <a:rPr lang="en-US" smtClean="0"/>
-              <a:t>10/16/2023</a:t>
+              <a:t>10/17/2023</a:t>
             </a:fld>
             <a:endParaRPr lang="en-US"/>
           </a:p>
@@ -2412,7 +2412,7 @@
           <a:p>
             <a:fld id="{B8236D89-3664-4D4B-9D57-535A908AD601}" type="datetimeFigureOut">
               <a:rPr lang="en-US" smtClean="0"/>
-              <a:t>10/16/2023</a:t>
+              <a:t>10/17/2023</a:t>
             </a:fld>
             <a:endParaRPr lang="en-US"/>
           </a:p>
@@ -2723,7 +2723,7 @@
           <a:p>
             <a:fld id="{B8236D89-3664-4D4B-9D57-535A908AD601}" type="datetimeFigureOut">
               <a:rPr lang="en-US" smtClean="0"/>
-              <a:t>10/16/2023</a:t>
+              <a:t>10/17/2023</a:t>
             </a:fld>
             <a:endParaRPr lang="en-US"/>
           </a:p>
@@ -3014,7 +3014,7 @@
           <a:p>
             <a:fld id="{B8236D89-3664-4D4B-9D57-535A908AD601}" type="datetimeFigureOut">
               <a:rPr lang="en-US" smtClean="0"/>
-              <a:t>10/16/2023</a:t>
+              <a:t>10/17/2023</a:t>
             </a:fld>
             <a:endParaRPr lang="en-US"/>
           </a:p>
@@ -3265,7 +3265,7 @@
           <a:p>
             <a:fld id="{B8236D89-3664-4D4B-9D57-535A908AD601}" type="datetimeFigureOut">
               <a:rPr lang="en-US" smtClean="0"/>
-              <a:t>10/16/2023</a:t>
+              <a:t>10/17/2023</a:t>
             </a:fld>
             <a:endParaRPr lang="en-US"/>
           </a:p>
@@ -3919,14 +3919,11 @@
               </a:spcBef>
             </a:pPr>
             <a:r>
-              <a:rPr lang="en-US" sz="2800">
+              <a:rPr lang="en-US" sz="2800" dirty="0">
                 <a:latin typeface="Abadi" panose="020B0604020104020204" pitchFamily="34" charset="0"/>
               </a:rPr>
               <a:t>Namespaces</a:t>
             </a:r>
-            <a:endParaRPr lang="en-US" sz="2800" dirty="0">
-              <a:latin typeface="Abadi" panose="020B0604020104020204" pitchFamily="34" charset="0"/>
-            </a:endParaRPr>
           </a:p>
           <a:p>
             <a:pPr algn="l">

</xml_diff>